<commit_message>
Reverts prof levels to 4 in the job analysis workshop pptx. [Fixes #129]
</commit_message>
<xml_diff>
--- a/toolkit/job-analysis/job-analysis-day-1-presentation.pptx
+++ b/toolkit/job-analysis/job-analysis-day-1-presentation.pptx
@@ -413,7 +413,7 @@
           <a:p>
             <a:fld id="{5F1244B9-655E-9143-8F11-143B7EBD7CDE}" type="datetimeFigureOut">
               <a:rPr lang="en-US" smtClean="0"/>
-              <a:t>9/25/19</a:t>
+              <a:t>1/7/20</a:t>
             </a:fld>
             <a:endParaRPr lang="en-US"/>
           </a:p>
@@ -6404,14 +6404,14 @@
               <a:buNone/>
             </a:pPr>
             <a:r>
-              <a:rPr lang="en-US" b="1" dirty="0"/>
+              <a:rPr lang="en-US" sz="2400" b="1" dirty="0"/>
               <a:t>Example Competency: Engineering Considerations</a:t>
             </a:r>
             <a:br>
-              <a:rPr lang="en-US" b="1" dirty="0"/>
+              <a:rPr lang="en-US" sz="2400" b="1" dirty="0"/>
             </a:br>
             <a:r>
-              <a:rPr lang="en-US" dirty="0"/>
+              <a:rPr lang="en-US" sz="2400" dirty="0"/>
               <a:t>Works effectively with engineers as a true partner. Understands the technical stack of a product and how it can impact product design and project schedules. Considers the complexities involved in building technology at massive scale.</a:t>
             </a:r>
           </a:p>
@@ -6420,16 +6420,12 @@
               <a:buNone/>
             </a:pPr>
             <a:r>
-              <a:rPr lang="en-US" b="1" i="1" dirty="0"/>
-              <a:t>Meets:</a:t>
-            </a:r>
-            <a:r>
-              <a:rPr lang="en-US" i="1" dirty="0"/>
-              <a:t> </a:t>
-            </a:r>
-            <a:r>
-              <a:rPr lang="en-US" dirty="0"/>
-              <a:t>Repeated track record of working as a true partner with engineers. Describes situations where they have engaged in technical decisions or shifted product or project plans due to technical issues. Understanding some of the complexities of building technology at massive scale.</a:t>
+              <a:rPr lang="en-US" sz="2400" b="1" i="1" dirty="0"/>
+              <a:t>Unfamiliar</a:t>
+            </a:r>
+            <a:r>
+              <a:rPr lang="en-US" sz="2400" dirty="0"/>
+              <a:t>: Has never worked with engineers, or has but not effectively/views them as a different group of people. Views technical matters as someone else's problem, and is unwilling to learn more about a project's technical foundations. Unable to describe a project's technical stack.</a:t>
             </a:r>
           </a:p>
           <a:p>
@@ -6437,20 +6433,39 @@
               <a:buNone/>
             </a:pPr>
             <a:r>
-              <a:rPr lang="en-US" b="1" i="1" dirty="0"/>
-              <a:t>Exceeds:</a:t>
-            </a:r>
-            <a:r>
-              <a:rPr lang="en-US" i="1" dirty="0"/>
-              <a:t> </a:t>
-            </a:r>
-            <a:r>
-              <a:rPr lang="en-US" dirty="0"/>
-              <a:t>Functions as a true partner with engineers in all technical products and projects in which they are involved. Able to identify potential technical concerns with proposals before consulting engineers. Repeatedly engages in technical decisions and supports engineering needs.</a:t>
-            </a:r>
-          </a:p>
-          <a:p>
-            <a:endParaRPr lang="en-US" dirty="0"/>
+              <a:rPr lang="en-US" sz="2400" b="1" i="1" dirty="0"/>
+              <a:t>Familiar</a:t>
+            </a:r>
+            <a:r>
+              <a:rPr lang="en-US" sz="2400" dirty="0"/>
+              <a:t>: Has some experience working effectively with engineers. Displays a basic understanding that technical choices impact product design and project schedules. Shows an active interest in learning more about a project's technical foundations.</a:t>
+            </a:r>
+          </a:p>
+          <a:p>
+            <a:pPr marL="171467" indent="0">
+              <a:buNone/>
+            </a:pPr>
+            <a:r>
+              <a:rPr lang="en-US" sz="2400" b="1" i="1" dirty="0"/>
+              <a:t>Experienced</a:t>
+            </a:r>
+            <a:r>
+              <a:rPr lang="en-US" sz="2400" dirty="0"/>
+              <a:t>: Repeated track record of working as a true partner with engineers. Describes situations where they have engaged in technical decisions or shifted product or project plans due to technical issues. Understanding some of the complexities of building technology at massive scale.</a:t>
+            </a:r>
+          </a:p>
+          <a:p>
+            <a:pPr marL="171467" indent="0">
+              <a:buNone/>
+            </a:pPr>
+            <a:r>
+              <a:rPr lang="en-US" sz="2400" b="1" i="1" dirty="0"/>
+              <a:t>Master</a:t>
+            </a:r>
+            <a:r>
+              <a:rPr lang="en-US" sz="2400" dirty="0"/>
+              <a:t>: Functions as a true partner with engineers in all technical products and projects in which they are involved. Able to identify potential technical concerns with proposals before consulting engineers. Repeatedly engages in technical decisions and supports engineering needs. </a:t>
+            </a:r>
           </a:p>
         </p:txBody>
       </p:sp>
@@ -7260,7 +7275,7 @@
             <a:pPr lvl="1"/>
             <a:r>
               <a:rPr lang="en-US" dirty="0"/>
-              <a:t>Create 2 (meets, exceeds) proficiency levels for each competency (1 hr)</a:t>
+              <a:t>Create 4 proficiency levels for each competency (1 hr)</a:t>
             </a:r>
           </a:p>
           <a:p>

</xml_diff>

<commit_message>
Notes updates from Stephanie.
</commit_message>
<xml_diff>
--- a/toolkit/job-analysis/job-analysis-day-1-presentation.pptx
+++ b/toolkit/job-analysis/job-analysis-day-1-presentation.pptx
@@ -30,30 +30,49 @@
   <p:notesSz cx="6881813" cy="9296400"/>
   <p:embeddedFontLst>
     <p:embeddedFont>
-      <p:font typeface="Avenir" panose="02000503020000020003" pitchFamily="2" charset="0"/>
+      <p:font typeface="Cambria" panose="02040503050406030204" pitchFamily="18" charset="0"/>
       <p:regular r:id="rId18"/>
-      <p:italic r:id="rId19"/>
+      <p:bold r:id="rId19"/>
+      <p:italic r:id="rId20"/>
+      <p:boldItalic r:id="rId21"/>
     </p:embeddedFont>
     <p:embeddedFont>
-      <p:font typeface="Merriweather Sans" pitchFamily="2" charset="77"/>
-      <p:regular r:id="rId20"/>
-      <p:bold r:id="rId21"/>
-      <p:italic r:id="rId22"/>
-      <p:boldItalic r:id="rId23"/>
-    </p:embeddedFont>
-    <p:embeddedFont>
-      <p:font typeface="Rockwell" panose="02060603020205020403" pitchFamily="18" charset="77"/>
-      <p:regular r:id="rId24"/>
-      <p:bold r:id="rId25"/>
-      <p:italic r:id="rId26"/>
-      <p:boldItalic r:id="rId27"/>
+      <p:font typeface="Rockwell" panose="02060603020205020403" pitchFamily="18" charset="0"/>
+      <p:regular r:id="rId22"/>
+      <p:bold r:id="rId23"/>
+      <p:italic r:id="rId24"/>
+      <p:boldItalic r:id="rId25"/>
     </p:embeddedFont>
     <p:embeddedFont>
       <p:font typeface="Source Sans Pro" panose="020B0503030403020204" pitchFamily="34" charset="0"/>
-      <p:regular r:id="rId28"/>
-      <p:bold r:id="rId29"/>
-      <p:italic r:id="rId30"/>
+      <p:regular r:id="rId26"/>
+      <p:bold r:id="rId27"/>
+      <p:italic r:id="rId28"/>
+      <p:boldItalic r:id="rId29"/>
+    </p:embeddedFont>
+    <p:embeddedFont>
+      <p:font typeface="Source Sans Pro SemiBold" panose="020B0603030403020204" pitchFamily="34" charset="0"/>
+      <p:bold r:id="rId30"/>
       <p:boldItalic r:id="rId31"/>
+    </p:embeddedFont>
+    <p:embeddedFont>
+      <p:font typeface="Avenir"/>
+      <p:regular r:id="rId32"/>
+      <p:italic r:id="rId33"/>
+    </p:embeddedFont>
+    <p:embeddedFont>
+      <p:font typeface="Merriweather" panose="00000500000000000000" pitchFamily="2" charset="0"/>
+      <p:regular r:id="rId34"/>
+      <p:bold r:id="rId35"/>
+      <p:italic r:id="rId36"/>
+      <p:boldItalic r:id="rId37"/>
+    </p:embeddedFont>
+    <p:embeddedFont>
+      <p:font typeface="Merriweather Sans"/>
+      <p:regular r:id="rId38"/>
+      <p:bold r:id="rId39"/>
+      <p:italic r:id="rId40"/>
+      <p:boldItalic r:id="rId41"/>
     </p:embeddedFont>
   </p:embeddedFontLst>
   <p:defaultTextStyle>
@@ -413,7 +432,7 @@
           <a:p>
             <a:fld id="{5F1244B9-655E-9143-8F11-143B7EBD7CDE}" type="datetimeFigureOut">
               <a:rPr lang="en-US" smtClean="0"/>
-              <a:t>1/7/20</a:t>
+              <a:t>1/8/2020</a:t>
             </a:fld>
             <a:endParaRPr lang="en-US"/>
           </a:p>
@@ -1239,6 +1258,213 @@
           <a:bodyPr/>
           <a:lstStyle/>
           <a:p>
+            <a:pPr marL="457200" marR="0" lvl="0" indent="-228600" algn="l" defTabSz="914400" rtl="0" eaLnBrk="1" fontAlgn="auto" latinLnBrk="0" hangingPunct="1">
+              <a:lnSpc>
+                <a:spcPct val="100000"/>
+              </a:lnSpc>
+              <a:spcBef>
+                <a:spcPts val="0"/>
+              </a:spcBef>
+              <a:spcAft>
+                <a:spcPts val="0"/>
+              </a:spcAft>
+              <a:buClr>
+                <a:srgbClr val="000000"/>
+              </a:buClr>
+              <a:buSzPts val="1400"/>
+              <a:buFont typeface="Arial"/>
+              <a:buNone/>
+              <a:tabLst/>
+              <a:defRPr/>
+            </a:pPr>
+            <a:r>
+              <a:rPr lang="en-US" dirty="0" smtClean="0"/>
+              <a:t>Note to facilitator:</a:t>
+            </a:r>
+            <a:r>
+              <a:rPr lang="en-US" baseline="0" dirty="0" smtClean="0"/>
+              <a:t> To save time, divide the room in half and have half the participants do half the competencies per group. The levels should built upon each other. They should be as succinct as possible.</a:t>
+            </a:r>
+            <a:endParaRPr lang="en-US" dirty="0" smtClean="0"/>
+          </a:p>
+          <a:p>
+            <a:endParaRPr lang="en-US" dirty="0"/>
+          </a:p>
+        </p:txBody>
+      </p:sp>
+    </p:spTree>
+    <p:extLst>
+      <p:ext uri="{BB962C8B-B14F-4D97-AF65-F5344CB8AC3E}">
+        <p14:creationId xmlns:p14="http://schemas.microsoft.com/office/powerpoint/2010/main" val="1961519449"/>
+      </p:ext>
+    </p:extLst>
+  </p:cSld>
+  <p:clrMapOvr>
+    <a:masterClrMapping/>
+  </p:clrMapOvr>
+</p:notes>
+</file>
+
+<file path=ppt/notesSlides/notesSlide11.xml><?xml version="1.0" encoding="utf-8"?>
+<p:notes xmlns:a="http://schemas.openxmlformats.org/drawingml/2006/main" xmlns:r="http://schemas.openxmlformats.org/officeDocument/2006/relationships" xmlns:p="http://schemas.openxmlformats.org/presentationml/2006/main" showMasterSp="0" showMasterPhAnim="0">
+  <p:cSld>
+    <p:spTree>
+      <p:nvGrpSpPr>
+        <p:cNvPr id="1" name="Shape 304"/>
+        <p:cNvGrpSpPr/>
+        <p:nvPr/>
+      </p:nvGrpSpPr>
+      <p:grpSpPr>
+        <a:xfrm>
+          <a:off x="0" y="0"/>
+          <a:ext cx="0" cy="0"/>
+          <a:chOff x="0" y="0"/>
+          <a:chExt cx="0" cy="0"/>
+        </a:xfrm>
+      </p:grpSpPr>
+      <p:sp>
+        <p:nvSpPr>
+          <p:cNvPr id="305" name="Google Shape;305;p34:notes"/>
+          <p:cNvSpPr txBox="1">
+            <a:spLocks noGrp="1"/>
+          </p:cNvSpPr>
+          <p:nvPr>
+            <p:ph type="body" idx="1"/>
+          </p:nvPr>
+        </p:nvSpPr>
+        <p:spPr>
+          <a:xfrm>
+            <a:off x="917575" y="4415790"/>
+            <a:ext cx="5046663" cy="4183380"/>
+          </a:xfrm>
+          <a:prstGeom prst="rect">
+            <a:avLst/>
+          </a:prstGeom>
+          <a:noFill/>
+          <a:ln>
+            <a:noFill/>
+          </a:ln>
+        </p:spPr>
+        <p:txBody>
+          <a:bodyPr spcFirstLastPara="1" wrap="square" lIns="92425" tIns="46200" rIns="92425" bIns="46200" anchor="t" anchorCtr="0">
+            <a:noAutofit/>
+          </a:bodyPr>
+          <a:lstStyle/>
+          <a:p>
+            <a:pPr marL="0" lvl="0" indent="0" algn="l" rtl="0">
+              <a:lnSpc>
+                <a:spcPct val="100000"/>
+              </a:lnSpc>
+              <a:spcBef>
+                <a:spcPts val="0"/>
+              </a:spcBef>
+              <a:spcAft>
+                <a:spcPts val="0"/>
+              </a:spcAft>
+              <a:buSzPts val="1400"/>
+              <a:buNone/>
+            </a:pPr>
+            <a:endParaRPr/>
+          </a:p>
+        </p:txBody>
+      </p:sp>
+      <p:sp>
+        <p:nvSpPr>
+          <p:cNvPr id="306" name="Google Shape;306;p34:notes"/>
+          <p:cNvSpPr>
+            <a:spLocks noGrp="1" noRot="1" noChangeAspect="1"/>
+          </p:cNvSpPr>
+          <p:nvPr>
+            <p:ph type="sldImg" idx="2"/>
+          </p:nvPr>
+        </p:nvSpPr>
+        <p:spPr>
+          <a:xfrm>
+            <a:off x="342900" y="696913"/>
+            <a:ext cx="6197600" cy="3486150"/>
+          </a:xfrm>
+          <a:custGeom>
+            <a:avLst/>
+            <a:gdLst/>
+            <a:ahLst/>
+            <a:cxnLst/>
+            <a:rect l="l" t="t" r="r" b="b"/>
+            <a:pathLst>
+              <a:path w="120000" h="120000" extrusionOk="0">
+                <a:moveTo>
+                  <a:pt x="0" y="0"/>
+                </a:moveTo>
+                <a:lnTo>
+                  <a:pt x="120000" y="0"/>
+                </a:lnTo>
+                <a:lnTo>
+                  <a:pt x="120000" y="120000"/>
+                </a:lnTo>
+                <a:lnTo>
+                  <a:pt x="0" y="120000"/>
+                </a:lnTo>
+                <a:close/>
+              </a:path>
+            </a:pathLst>
+          </a:custGeom>
+          <a:noFill/>
+          <a:ln>
+            <a:noFill/>
+          </a:ln>
+        </p:spPr>
+      </p:sp>
+    </p:spTree>
+  </p:cSld>
+  <p:clrMapOvr>
+    <a:masterClrMapping/>
+  </p:clrMapOvr>
+</p:notes>
+</file>
+
+<file path=ppt/notesSlides/notesSlide12.xml><?xml version="1.0" encoding="utf-8"?>
+<p:notes xmlns:a="http://schemas.openxmlformats.org/drawingml/2006/main" xmlns:r="http://schemas.openxmlformats.org/officeDocument/2006/relationships" xmlns:p="http://schemas.openxmlformats.org/presentationml/2006/main">
+  <p:cSld>
+    <p:spTree>
+      <p:nvGrpSpPr>
+        <p:cNvPr id="1" name=""/>
+        <p:cNvGrpSpPr/>
+        <p:nvPr/>
+      </p:nvGrpSpPr>
+      <p:grpSpPr>
+        <a:xfrm>
+          <a:off x="0" y="0"/>
+          <a:ext cx="0" cy="0"/>
+          <a:chOff x="0" y="0"/>
+          <a:chExt cx="0" cy="0"/>
+        </a:xfrm>
+      </p:grpSpPr>
+      <p:sp>
+        <p:nvSpPr>
+          <p:cNvPr id="2" name="Slide Image Placeholder 1"/>
+          <p:cNvSpPr>
+            <a:spLocks noGrp="1" noRot="1" noChangeAspect="1"/>
+          </p:cNvSpPr>
+          <p:nvPr>
+            <p:ph type="sldImg"/>
+          </p:nvPr>
+        </p:nvSpPr>
+        <p:spPr/>
+      </p:sp>
+      <p:sp>
+        <p:nvSpPr>
+          <p:cNvPr id="3" name="Notes Placeholder 2"/>
+          <p:cNvSpPr>
+            <a:spLocks noGrp="1"/>
+          </p:cNvSpPr>
+          <p:nvPr>
+            <p:ph type="body" idx="1"/>
+          </p:nvPr>
+        </p:nvSpPr>
+        <p:spPr/>
+        <p:txBody>
+          <a:bodyPr/>
+          <a:lstStyle/>
+          <a:p>
             <a:endParaRPr lang="en-US" dirty="0"/>
           </a:p>
         </p:txBody>
@@ -2381,9 +2607,126 @@
               <a:defRPr/>
             </a:pPr>
             <a:r>
-              <a:rPr lang="en-US" sz="3600" dirty="0"/>
+              <a:rPr lang="en-US" sz="3600" dirty="0" smtClean="0"/>
+              <a:t>Notes for instructor:</a:t>
+            </a:r>
+            <a:r>
+              <a:rPr lang="en-US" sz="3600" baseline="0" dirty="0" smtClean="0"/>
+              <a:t> </a:t>
+            </a:r>
+            <a:r>
+              <a:rPr lang="en-US" sz="3600" dirty="0" smtClean="0"/>
               <a:t>Participants will take about 15 minutes to write down daily job tasks for the role </a:t>
             </a:r>
+          </a:p>
+          <a:p>
+            <a:pPr marL="0" marR="0" lvl="0" indent="0" algn="l" defTabSz="914400" rtl="0" eaLnBrk="1" fontAlgn="auto" latinLnBrk="0" hangingPunct="1">
+              <a:lnSpc>
+                <a:spcPct val="100000"/>
+              </a:lnSpc>
+              <a:spcBef>
+                <a:spcPts val="0"/>
+              </a:spcBef>
+              <a:spcAft>
+                <a:spcPts val="0"/>
+              </a:spcAft>
+              <a:buClr>
+                <a:srgbClr val="000000"/>
+              </a:buClr>
+              <a:buSzPts val="1400"/>
+              <a:buFont typeface="Arial"/>
+              <a:buNone/>
+              <a:tabLst/>
+              <a:defRPr/>
+            </a:pPr>
+            <a:r>
+              <a:rPr lang="en-US" sz="3600" dirty="0" smtClean="0"/>
+              <a:t>After</a:t>
+            </a:r>
+            <a:r>
+              <a:rPr lang="en-US" sz="3600" baseline="0" dirty="0" smtClean="0"/>
+              <a:t> 10 minutes, if some folks are done, invite them to start coming up to put their tasks down while reading them aloud. If any are multiple tasks in one note, the leader should ask them to break it up into two different notes. If something is not really a task beginning with a verb, it should also be sent back.</a:t>
+            </a:r>
+          </a:p>
+          <a:p>
+            <a:pPr marL="0" marR="0" lvl="0" indent="0" algn="l" defTabSz="914400" rtl="0" eaLnBrk="1" fontAlgn="auto" latinLnBrk="0" hangingPunct="1">
+              <a:lnSpc>
+                <a:spcPct val="100000"/>
+              </a:lnSpc>
+              <a:spcBef>
+                <a:spcPts val="0"/>
+              </a:spcBef>
+              <a:spcAft>
+                <a:spcPts val="0"/>
+              </a:spcAft>
+              <a:buClr>
+                <a:srgbClr val="000000"/>
+              </a:buClr>
+              <a:buSzPts val="1400"/>
+              <a:buFont typeface="Arial"/>
+              <a:buNone/>
+              <a:tabLst/>
+              <a:defRPr/>
+            </a:pPr>
+            <a:r>
+              <a:rPr lang="en-US" sz="3600" baseline="0" dirty="0" smtClean="0"/>
+              <a:t>As people come up to read and add their notes, if they’re similar to another note, they should put them close together.</a:t>
+            </a:r>
+          </a:p>
+          <a:p>
+            <a:pPr marL="0" marR="0" lvl="0" indent="0" algn="l" defTabSz="914400" rtl="0" eaLnBrk="1" fontAlgn="auto" latinLnBrk="0" hangingPunct="1">
+              <a:lnSpc>
+                <a:spcPct val="100000"/>
+              </a:lnSpc>
+              <a:spcBef>
+                <a:spcPts val="0"/>
+              </a:spcBef>
+              <a:spcAft>
+                <a:spcPts val="0"/>
+              </a:spcAft>
+              <a:buClr>
+                <a:srgbClr val="000000"/>
+              </a:buClr>
+              <a:buSzPts val="1400"/>
+              <a:buFont typeface="Arial"/>
+              <a:buNone/>
+              <a:tabLst/>
+              <a:defRPr/>
+            </a:pPr>
+            <a:r>
+              <a:rPr lang="en-US" sz="3600" baseline="0" dirty="0" smtClean="0"/>
+              <a:t>Then the whole group should come up and make sure all common tasks are bunched up together. </a:t>
+            </a:r>
+          </a:p>
+          <a:p>
+            <a:pPr marL="0" marR="0" lvl="0" indent="0" algn="l" defTabSz="914400" rtl="0" eaLnBrk="1" fontAlgn="auto" latinLnBrk="0" hangingPunct="1">
+              <a:lnSpc>
+                <a:spcPct val="100000"/>
+              </a:lnSpc>
+              <a:spcBef>
+                <a:spcPts val="0"/>
+              </a:spcBef>
+              <a:spcAft>
+                <a:spcPts val="0"/>
+              </a:spcAft>
+              <a:buClr>
+                <a:srgbClr val="000000"/>
+              </a:buClr>
+              <a:buSzPts val="1400"/>
+              <a:buFont typeface="Arial"/>
+              <a:buNone/>
+              <a:tabLst/>
+              <a:defRPr/>
+            </a:pPr>
+            <a:r>
+              <a:rPr lang="en-US" sz="3600" dirty="0" smtClean="0"/>
+              <a:t> Then the group can create a competency name that they think is covered</a:t>
+            </a:r>
+            <a:r>
+              <a:rPr lang="en-US" sz="3600" baseline="0" dirty="0" smtClean="0"/>
+              <a:t> by each common group of tasks. </a:t>
+            </a:r>
+            <a:endParaRPr lang="en-US" sz="3600" dirty="0" smtClean="0"/>
           </a:p>
           <a:p>
             <a:pPr marL="0" lvl="0" indent="0" algn="l" rtl="0">
@@ -2395,10 +2738,7 @@
               </a:spcAft>
               <a:buNone/>
             </a:pPr>
-            <a:r>
-              <a:rPr lang="en-US" sz="3600" dirty="0"/>
-              <a:t>Then group similar tasks</a:t>
-            </a:r>
+            <a:endParaRPr lang="en-US" sz="3600" dirty="0" smtClean="0"/>
           </a:p>
           <a:p>
             <a:pPr marL="0" lvl="0" indent="0" algn="l" rtl="0">
@@ -2411,40 +2751,22 @@
               <a:buNone/>
             </a:pPr>
             <a:r>
-              <a:rPr lang="en-US" sz="3600" dirty="0"/>
-              <a:t>Name each group</a:t>
-            </a:r>
-          </a:p>
-          <a:p>
-            <a:pPr marL="0" lvl="0" indent="0" algn="l" rtl="0">
-              <a:spcBef>
-                <a:spcPts val="0"/>
-              </a:spcBef>
-              <a:spcAft>
-                <a:spcPts val="0"/>
-              </a:spcAft>
-              <a:buNone/>
-            </a:pPr>
-            <a:r>
-              <a:rPr lang="en-US" sz="3600" dirty="0"/>
-              <a:t>Name for each group becomes a competency</a:t>
-            </a:r>
-          </a:p>
-          <a:p>
-            <a:pPr marL="0" lvl="0" indent="0" algn="l" rtl="0">
-              <a:spcBef>
-                <a:spcPts val="0"/>
-              </a:spcBef>
-              <a:spcAft>
-                <a:spcPts val="0"/>
-              </a:spcAft>
-              <a:buNone/>
-            </a:pPr>
-            <a:r>
-              <a:rPr lang="en-US" sz="3600" dirty="0"/>
-              <a:t>Add in more competencies as needed to cover “EQ” (emotional intelligence) and technical knowledge if they weren’t covered by job task exercise</a:t>
-            </a:r>
-            <a:endParaRPr sz="3600" dirty="0"/>
+              <a:rPr lang="en-US" sz="3600" dirty="0" smtClean="0"/>
+              <a:t>Ask</a:t>
+            </a:r>
+            <a:r>
+              <a:rPr lang="en-US" sz="3600" baseline="0" dirty="0" smtClean="0"/>
+              <a:t> the SMEs if there are any EQ related competencies they think are required that are not represented by the groupings. Also ask them if there is enough technical competencies represented versus only soft competencies (leadership, collaboration, analysis, </a:t>
+            </a:r>
+            <a:r>
+              <a:rPr lang="en-US" sz="3600" baseline="0" dirty="0" err="1" smtClean="0"/>
+              <a:t>etc</a:t>
+            </a:r>
+            <a:r>
+              <a:rPr lang="en-US" sz="3600" baseline="0" dirty="0" smtClean="0"/>
+              <a:t>).  </a:t>
+            </a:r>
+            <a:endParaRPr lang="en-US" sz="3600" dirty="0"/>
           </a:p>
         </p:txBody>
       </p:sp>
@@ -2524,70 +2846,6 @@
               <a:tabLst/>
               <a:defRPr/>
             </a:pPr>
-            <a:r>
-              <a:rPr lang="en-US" sz="2400" dirty="0"/>
-              <a:t>Participants will take about 15 minutes to write down daily job tasks for the role </a:t>
-            </a:r>
-          </a:p>
-          <a:p>
-            <a:pPr marL="0" lvl="0" indent="0" algn="l" rtl="0">
-              <a:spcBef>
-                <a:spcPts val="0"/>
-              </a:spcBef>
-              <a:spcAft>
-                <a:spcPts val="0"/>
-              </a:spcAft>
-              <a:buNone/>
-            </a:pPr>
-            <a:r>
-              <a:rPr lang="en-US" sz="2400" dirty="0"/>
-              <a:t>Then group similar tasks</a:t>
-            </a:r>
-          </a:p>
-          <a:p>
-            <a:pPr marL="0" lvl="0" indent="0" algn="l" rtl="0">
-              <a:spcBef>
-                <a:spcPts val="0"/>
-              </a:spcBef>
-              <a:spcAft>
-                <a:spcPts val="0"/>
-              </a:spcAft>
-              <a:buNone/>
-            </a:pPr>
-            <a:r>
-              <a:rPr lang="en-US" sz="2400" dirty="0"/>
-              <a:t>Name each group</a:t>
-            </a:r>
-          </a:p>
-          <a:p>
-            <a:pPr marL="0" lvl="0" indent="0" algn="l" rtl="0">
-              <a:spcBef>
-                <a:spcPts val="0"/>
-              </a:spcBef>
-              <a:spcAft>
-                <a:spcPts val="0"/>
-              </a:spcAft>
-              <a:buNone/>
-            </a:pPr>
-            <a:r>
-              <a:rPr lang="en-US" sz="2400" dirty="0"/>
-              <a:t>Name for each group becomes a competency</a:t>
-            </a:r>
-          </a:p>
-          <a:p>
-            <a:pPr marL="0" lvl="0" indent="0" algn="l" rtl="0">
-              <a:spcBef>
-                <a:spcPts val="0"/>
-              </a:spcBef>
-              <a:spcAft>
-                <a:spcPts val="0"/>
-              </a:spcAft>
-              <a:buNone/>
-            </a:pPr>
-            <a:r>
-              <a:rPr lang="en-US" sz="2400" dirty="0"/>
-              <a:t>Add in more competencies as needed to cover “EQ” (emotional intelligence) and technical knowledge if they weren’t covered by job task exercise</a:t>
-            </a:r>
             <a:endParaRPr lang="en-US" dirty="0"/>
           </a:p>
         </p:txBody>
@@ -2651,56 +2909,12 @@
           <a:p>
             <a:endParaRPr lang="en-US" dirty="0"/>
           </a:p>
-          <a:p>
-            <a:r>
-              <a:rPr lang="en-US" sz="2200" b="0" i="0" u="none" strike="noStrike" cap="none" dirty="0">
-                <a:solidFill>
-                  <a:srgbClr val="000000"/>
-                </a:solidFill>
-                <a:effectLst/>
-                <a:latin typeface="Merriweather Sans"/>
-                <a:ea typeface="Merriweather Sans"/>
-                <a:cs typeface="Merriweather Sans"/>
-                <a:sym typeface="Merriweather Sans"/>
-              </a:rPr>
-              <a:t>DO NOT require agency-specific certifications, technologies, etc. that aren’t common in the private sector. </a:t>
-            </a:r>
-          </a:p>
-          <a:p>
-            <a:endParaRPr lang="en-US" sz="2200" b="0" i="0" u="none" strike="noStrike" cap="none" dirty="0">
-              <a:solidFill>
-                <a:srgbClr val="000000"/>
-              </a:solidFill>
-              <a:effectLst/>
-              <a:latin typeface="Merriweather Sans"/>
-              <a:ea typeface="Merriweather Sans"/>
-              <a:cs typeface="Merriweather Sans"/>
-              <a:sym typeface="Merriweather Sans"/>
-            </a:endParaRPr>
-          </a:p>
-          <a:p>
-            <a:r>
-              <a:rPr lang="en-US" sz="2200" b="0" i="0" u="none" strike="noStrike" cap="none" dirty="0">
-                <a:solidFill>
-                  <a:srgbClr val="000000"/>
-                </a:solidFill>
-                <a:effectLst/>
-                <a:latin typeface="Merriweather Sans"/>
-                <a:sym typeface="Merriweather Sans"/>
-              </a:rPr>
-              <a:t>DO NOT require experience with government-only tech, this may exclude private sector applicants who could do the job well</a:t>
-            </a:r>
-            <a:endParaRPr lang="en-US" dirty="0"/>
-          </a:p>
-          <a:p>
-            <a:endParaRPr lang="en-US" dirty="0"/>
-          </a:p>
         </p:txBody>
       </p:sp>
     </p:spTree>
     <p:extLst>
       <p:ext uri="{BB962C8B-B14F-4D97-AF65-F5344CB8AC3E}">
-        <p14:creationId xmlns:p14="http://schemas.microsoft.com/office/powerpoint/2010/main" val="4230347775"/>
+        <p14:creationId xmlns:p14="http://schemas.microsoft.com/office/powerpoint/2010/main" val="627141534"/>
       </p:ext>
     </p:extLst>
   </p:cSld>
@@ -2754,19 +2968,48 @@
           <a:bodyPr/>
           <a:lstStyle/>
           <a:p>
-            <a:r>
-              <a:rPr lang="en-US" dirty="0"/>
-              <a:t>Hopefully the resume review exercise elicited discussions about the required level for each competency</a:t>
-            </a:r>
-          </a:p>
-          <a:p>
             <a:endParaRPr lang="en-US" dirty="0"/>
           </a:p>
           <a:p>
             <a:r>
-              <a:rPr lang="en-US" dirty="0"/>
-              <a:t>Define what “meets” vs. “exceeds” means for each competency and document </a:t>
-            </a:r>
+              <a:rPr lang="en-US" sz="2200" b="0" i="0" u="none" strike="noStrike" cap="none" dirty="0">
+                <a:solidFill>
+                  <a:srgbClr val="000000"/>
+                </a:solidFill>
+                <a:effectLst/>
+                <a:latin typeface="Merriweather Sans"/>
+                <a:ea typeface="Merriweather Sans"/>
+                <a:cs typeface="Merriweather Sans"/>
+                <a:sym typeface="Merriweather Sans"/>
+              </a:rPr>
+              <a:t>DO NOT require agency-specific certifications, technologies, etc. that aren’t common in the private sector. </a:t>
+            </a:r>
+          </a:p>
+          <a:p>
+            <a:endParaRPr lang="en-US" sz="2200" b="0" i="0" u="none" strike="noStrike" cap="none" dirty="0">
+              <a:solidFill>
+                <a:srgbClr val="000000"/>
+              </a:solidFill>
+              <a:effectLst/>
+              <a:latin typeface="Merriweather Sans"/>
+              <a:ea typeface="Merriweather Sans"/>
+              <a:cs typeface="Merriweather Sans"/>
+              <a:sym typeface="Merriweather Sans"/>
+            </a:endParaRPr>
+          </a:p>
+          <a:p>
+            <a:r>
+              <a:rPr lang="en-US" sz="2200" b="0" i="0" u="none" strike="noStrike" cap="none" dirty="0">
+                <a:solidFill>
+                  <a:srgbClr val="000000"/>
+                </a:solidFill>
+                <a:effectLst/>
+                <a:latin typeface="Merriweather Sans"/>
+                <a:sym typeface="Merriweather Sans"/>
+              </a:rPr>
+              <a:t>DO NOT require experience with government-only tech, this may exclude private sector applicants who could do the job well</a:t>
+            </a:r>
+            <a:endParaRPr lang="en-US" dirty="0"/>
           </a:p>
           <a:p>
             <a:endParaRPr lang="en-US" dirty="0"/>
@@ -2776,7 +3019,7 @@
     </p:spTree>
     <p:extLst>
       <p:ext uri="{BB962C8B-B14F-4D97-AF65-F5344CB8AC3E}">
-        <p14:creationId xmlns:p14="http://schemas.microsoft.com/office/powerpoint/2010/main" val="3067309723"/>
+        <p14:creationId xmlns:p14="http://schemas.microsoft.com/office/powerpoint/2010/main" val="4230347775"/>
       </p:ext>
     </p:extLst>
   </p:cSld>
@@ -2787,11 +3030,11 @@
 </file>
 
 <file path=ppt/notesSlides/notesSlide9.xml><?xml version="1.0" encoding="utf-8"?>
-<p:notes xmlns:a="http://schemas.openxmlformats.org/drawingml/2006/main" xmlns:r="http://schemas.openxmlformats.org/officeDocument/2006/relationships" xmlns:p="http://schemas.openxmlformats.org/presentationml/2006/main" showMasterSp="0" showMasterPhAnim="0">
+<p:notes xmlns:a="http://schemas.openxmlformats.org/drawingml/2006/main" xmlns:r="http://schemas.openxmlformats.org/officeDocument/2006/relationships" xmlns:p="http://schemas.openxmlformats.org/presentationml/2006/main">
   <p:cSld>
     <p:spTree>
       <p:nvGrpSpPr>
-        <p:cNvPr id="1" name="Shape 304"/>
+        <p:cNvPr id="1" name=""/>
         <p:cNvGrpSpPr/>
         <p:nvPr/>
       </p:nvGrpSpPr>
@@ -2805,96 +3048,49 @@
       </p:grpSpPr>
       <p:sp>
         <p:nvSpPr>
-          <p:cNvPr id="305" name="Google Shape;305;p34:notes"/>
-          <p:cNvSpPr txBox="1">
+          <p:cNvPr id="2" name="Slide Image Placeholder 1"/>
+          <p:cNvSpPr>
+            <a:spLocks noGrp="1" noRot="1" noChangeAspect="1"/>
+          </p:cNvSpPr>
+          <p:nvPr>
+            <p:ph type="sldImg"/>
+          </p:nvPr>
+        </p:nvSpPr>
+        <p:spPr/>
+      </p:sp>
+      <p:sp>
+        <p:nvSpPr>
+          <p:cNvPr id="3" name="Notes Placeholder 2"/>
+          <p:cNvSpPr>
             <a:spLocks noGrp="1"/>
           </p:cNvSpPr>
           <p:nvPr>
             <p:ph type="body" idx="1"/>
           </p:nvPr>
         </p:nvSpPr>
-        <p:spPr>
-          <a:xfrm>
-            <a:off x="917575" y="4415790"/>
-            <a:ext cx="5046663" cy="4183380"/>
-          </a:xfrm>
-          <a:prstGeom prst="rect">
-            <a:avLst/>
-          </a:prstGeom>
-          <a:noFill/>
-          <a:ln>
-            <a:noFill/>
-          </a:ln>
-        </p:spPr>
+        <p:spPr/>
         <p:txBody>
-          <a:bodyPr spcFirstLastPara="1" wrap="square" lIns="92425" tIns="46200" rIns="92425" bIns="46200" anchor="t" anchorCtr="0">
-            <a:noAutofit/>
-          </a:bodyPr>
+          <a:bodyPr/>
           <a:lstStyle/>
           <a:p>
-            <a:pPr marL="0" lvl="0" indent="0" algn="l" rtl="0">
-              <a:lnSpc>
-                <a:spcPct val="100000"/>
-              </a:lnSpc>
-              <a:spcBef>
-                <a:spcPts val="0"/>
-              </a:spcBef>
-              <a:spcAft>
-                <a:spcPts val="0"/>
-              </a:spcAft>
-              <a:buSzPts val="1400"/>
-              <a:buNone/>
-            </a:pPr>
-            <a:endParaRPr/>
+            <a:r>
+              <a:rPr lang="en-US" dirty="0" smtClean="0"/>
+              <a:t>Note to facilitator:</a:t>
+            </a:r>
+            <a:r>
+              <a:rPr lang="en-US" baseline="0" dirty="0" smtClean="0"/>
+              <a:t> To save time, divide the room in half and have half the participants do half the competencies per group. The levels should built upon each other. They should be as succinct as possible.</a:t>
+            </a:r>
+            <a:endParaRPr lang="en-US" dirty="0"/>
           </a:p>
         </p:txBody>
       </p:sp>
-      <p:sp>
-        <p:nvSpPr>
-          <p:cNvPr id="306" name="Google Shape;306;p34:notes"/>
-          <p:cNvSpPr>
-            <a:spLocks noGrp="1" noRot="1" noChangeAspect="1"/>
-          </p:cNvSpPr>
-          <p:nvPr>
-            <p:ph type="sldImg" idx="2"/>
-          </p:nvPr>
-        </p:nvSpPr>
-        <p:spPr>
-          <a:xfrm>
-            <a:off x="342900" y="696913"/>
-            <a:ext cx="6197600" cy="3486150"/>
-          </a:xfrm>
-          <a:custGeom>
-            <a:avLst/>
-            <a:gdLst/>
-            <a:ahLst/>
-            <a:cxnLst/>
-            <a:rect l="l" t="t" r="r" b="b"/>
-            <a:pathLst>
-              <a:path w="120000" h="120000" extrusionOk="0">
-                <a:moveTo>
-                  <a:pt x="0" y="0"/>
-                </a:moveTo>
-                <a:lnTo>
-                  <a:pt x="120000" y="0"/>
-                </a:lnTo>
-                <a:lnTo>
-                  <a:pt x="120000" y="120000"/>
-                </a:lnTo>
-                <a:lnTo>
-                  <a:pt x="0" y="120000"/>
-                </a:lnTo>
-                <a:close/>
-              </a:path>
-            </a:pathLst>
-          </a:custGeom>
-          <a:noFill/>
-          <a:ln>
-            <a:noFill/>
-          </a:ln>
-        </p:spPr>
-      </p:sp>
     </p:spTree>
+    <p:extLst>
+      <p:ext uri="{BB962C8B-B14F-4D97-AF65-F5344CB8AC3E}">
+        <p14:creationId xmlns:p14="http://schemas.microsoft.com/office/powerpoint/2010/main" val="3067309723"/>
+      </p:ext>
+    </p:extLst>
   </p:cSld>
   <p:clrMapOvr>
     <a:masterClrMapping/>
@@ -6366,8 +6562,20 @@
           <a:lstStyle/>
           <a:p>
             <a:r>
+              <a:rPr lang="en-US" dirty="0" smtClean="0"/>
+              <a:t>Create </a:t>
+            </a:r>
+            <a:r>
               <a:rPr lang="en-US" dirty="0"/>
-              <a:t>Example proficiency levels for a competency</a:t>
+              <a:t>proficiency levels for </a:t>
+            </a:r>
+            <a:r>
+              <a:rPr lang="en-US" dirty="0" smtClean="0"/>
+              <a:t>EACH </a:t>
+            </a:r>
+            <a:r>
+              <a:rPr lang="en-US" dirty="0"/>
+              <a:t>competency</a:t>
             </a:r>
           </a:p>
         </p:txBody>
@@ -6724,14 +6932,35 @@
           <a:p>
             <a:r>
               <a:rPr lang="en-US" dirty="0"/>
-              <a:t>Once you've defined the competencies and their proficiency levels, you establish what is minimally required from day one. </a:t>
-            </a:r>
-          </a:p>
-          <a:p>
+              <a:t>Once you've defined the competencies and their proficiency levels, you establish </a:t>
+            </a:r>
+            <a:r>
+              <a:rPr lang="en-US" dirty="0" smtClean="0"/>
+              <a:t>at which level a year’s worth of experience is required from day one in order to qualify for a certain grade level. </a:t>
+            </a:r>
+          </a:p>
+          <a:p>
+            <a:r>
+              <a:rPr lang="en-US" dirty="0" smtClean="0"/>
+              <a:t>The </a:t>
+            </a:r>
             <a:r>
               <a:rPr lang="en-US" dirty="0"/>
-              <a:t>The same set of competencies can be used for different positions because roles that require more seniority set the minimum qualification bar higher than more junior roles.</a:t>
-            </a:r>
+              <a:t>same set of competencies can be used for different </a:t>
+            </a:r>
+            <a:r>
+              <a:rPr lang="en-US" dirty="0" smtClean="0"/>
+              <a:t>grade levels </a:t>
+            </a:r>
+            <a:r>
+              <a:rPr lang="en-US" dirty="0"/>
+              <a:t>because roles that require more seniority </a:t>
+            </a:r>
+            <a:r>
+              <a:rPr lang="en-US" dirty="0" smtClean="0"/>
+              <a:t>can require more expert proficiency levels.  </a:t>
+            </a:r>
+            <a:endParaRPr lang="en-US" dirty="0"/>
           </a:p>
         </p:txBody>
       </p:sp>
@@ -7062,9 +7291,18 @@
               <a:buChar char="•"/>
             </a:pPr>
             <a:r>
+              <a:rPr lang="en-US" dirty="0" smtClean="0"/>
+              <a:t>Bring example </a:t>
+            </a:r>
+            <a:r>
               <a:rPr lang="en-US" dirty="0"/>
-              <a:t>Example competencies and proficiencies from other hiring actions???</a:t>
-            </a:r>
+              <a:t>competencies and proficiencies </a:t>
+            </a:r>
+            <a:r>
+              <a:rPr lang="en-US" dirty="0" smtClean="0"/>
+              <a:t>from within the agency and from OPM’s mosaic competencies for potential use as a starting point</a:t>
+            </a:r>
+            <a:endParaRPr lang="en-US" dirty="0"/>
           </a:p>
           <a:p>
             <a:pPr marL="742967" indent="-571500">
@@ -7076,30 +7314,12 @@
             </a:pPr>
             <a:r>
               <a:rPr lang="en-US" dirty="0"/>
-              <a:t>Bring workshop supplies: name tags, post-it notes, Sharpies, large easel-size post-it paper, dots for voting</a:t>
-            </a:r>
-          </a:p>
-          <a:p>
-            <a:pPr marL="742967" indent="-571500">
-              <a:buClr>
-                <a:schemeClr val="tx2"/>
-              </a:buClr>
-              <a:buFont typeface="Arial" panose="020B0604020202020204" pitchFamily="34" charset="0"/>
-              <a:buChar char="•"/>
-            </a:pPr>
-            <a:r>
-              <a:rPr lang="en-US" dirty="0"/>
-              <a:t>Developing Core Competencies and Interview Questions handout</a:t>
-            </a:r>
-          </a:p>
-          <a:p>
-            <a:pPr marL="742967" indent="-571500">
-              <a:buClr>
-                <a:schemeClr val="tx2"/>
-              </a:buClr>
-              <a:buFont typeface="Arial" panose="020B0604020202020204" pitchFamily="34" charset="0"/>
-              <a:buChar char="•"/>
-            </a:pPr>
+              <a:t>Bring workshop supplies: name tags, post-it notes, Sharpies, large easel-size post-it paper, dots for </a:t>
+            </a:r>
+            <a:r>
+              <a:rPr lang="en-US" dirty="0" smtClean="0"/>
+              <a:t>voting</a:t>
+            </a:r>
             <a:endParaRPr lang="en-US" dirty="0"/>
           </a:p>
           <a:p>
@@ -7780,8 +8000,19 @@
           <a:p>
             <a:r>
               <a:rPr lang="en-US" dirty="0"/>
-              <a:t>Goal is to select 4–6 critical competencies.</a:t>
-            </a:r>
+              <a:t>Goal is to select 4–6 critical competencies</a:t>
+            </a:r>
+            <a:r>
+              <a:rPr lang="en-US" dirty="0" smtClean="0"/>
+              <a:t>.</a:t>
+            </a:r>
+          </a:p>
+          <a:p>
+            <a:r>
+              <a:rPr lang="en-US" dirty="0" smtClean="0"/>
+              <a:t>During this exercise, limit the number of tasks to just 4-5 under each competency.</a:t>
+            </a:r>
+            <a:endParaRPr lang="en-US" dirty="0"/>
           </a:p>
           <a:p>
             <a:endParaRPr lang="en-US" dirty="0"/>

</xml_diff>

<commit_message>
update the graphic in the job analysis ppt
making "assessments" instead of "phone interview assessments"
</commit_message>
<xml_diff>
--- a/toolkit/job-analysis/job-analysis-day-1-presentation.pptx
+++ b/toolkit/job-analysis/job-analysis-day-1-presentation.pptx
@@ -1,6 +1,6 @@
 
 <file path=ppt/presentation.xml><?xml version="1.0" encoding="utf-8"?>
-<p:presentation xmlns:a="http://schemas.openxmlformats.org/drawingml/2006/main" xmlns:r="http://schemas.openxmlformats.org/officeDocument/2006/relationships" xmlns:p="http://schemas.openxmlformats.org/presentationml/2006/main" showSpecialPlsOnTitleSld="0" strictFirstAndLastChars="0" embedTrueTypeFonts="1" saveSubsetFonts="1" autoCompressPictures="0">
+<p:presentation xmlns:a="http://schemas.openxmlformats.org/drawingml/2006/main" xmlns:r="http://schemas.openxmlformats.org/officeDocument/2006/relationships" xmlns:p="http://schemas.openxmlformats.org/presentationml/2006/main" showSpecialPlsOnTitleSld="0" strictFirstAndLastChars="0" embedTrueTypeFonts="1" autoCompressPictures="0">
   <p:sldMasterIdLst>
     <p:sldMasterId id="2147483666" r:id="rId1"/>
   </p:sldMasterIdLst>
@@ -30,48 +30,48 @@
   <p:notesSz cx="6881813" cy="9296400"/>
   <p:embeddedFontLst>
     <p:embeddedFont>
-      <p:font typeface="Cambria" panose="02040503050406030204" pitchFamily="18" charset="0"/>
+      <p:font typeface="Avenir" panose="02000503020000020003" pitchFamily="2" charset="0"/>
       <p:regular r:id="rId18"/>
-      <p:bold r:id="rId19"/>
-      <p:italic r:id="rId20"/>
-      <p:boldItalic r:id="rId21"/>
+      <p:italic r:id="rId19"/>
     </p:embeddedFont>
     <p:embeddedFont>
-      <p:font typeface="Rockwell" panose="02060603020205020403" pitchFamily="18" charset="0"/>
-      <p:regular r:id="rId22"/>
-      <p:bold r:id="rId23"/>
-      <p:italic r:id="rId24"/>
-      <p:boldItalic r:id="rId25"/>
+      <p:font typeface="Cambria" panose="02040503050406030204" pitchFamily="18" charset="0"/>
+      <p:regular r:id="rId20"/>
+      <p:bold r:id="rId21"/>
+      <p:italic r:id="rId22"/>
+      <p:boldItalic r:id="rId23"/>
+    </p:embeddedFont>
+    <p:embeddedFont>
+      <p:font typeface="Merriweather" pitchFamily="2" charset="77"/>
+      <p:regular r:id="rId24"/>
+      <p:bold r:id="rId25"/>
+      <p:italic r:id="rId26"/>
+      <p:boldItalic r:id="rId27"/>
+    </p:embeddedFont>
+    <p:embeddedFont>
+      <p:font typeface="Merriweather Sans" pitchFamily="2" charset="77"/>
+      <p:regular r:id="rId28"/>
+      <p:bold r:id="rId29"/>
+      <p:italic r:id="rId30"/>
+      <p:boldItalic r:id="rId31"/>
+    </p:embeddedFont>
+    <p:embeddedFont>
+      <p:font typeface="Rockwell" panose="02060603020205020403" pitchFamily="18" charset="77"/>
+      <p:regular r:id="rId32"/>
+      <p:bold r:id="rId33"/>
+      <p:italic r:id="rId34"/>
+      <p:boldItalic r:id="rId35"/>
     </p:embeddedFont>
     <p:embeddedFont>
       <p:font typeface="Source Sans Pro" panose="020B0503030403020204" pitchFamily="34" charset="0"/>
-      <p:regular r:id="rId26"/>
-      <p:bold r:id="rId27"/>
-      <p:italic r:id="rId28"/>
-      <p:boldItalic r:id="rId29"/>
+      <p:regular r:id="rId36"/>
+      <p:bold r:id="rId37"/>
+      <p:italic r:id="rId38"/>
+      <p:boldItalic r:id="rId39"/>
     </p:embeddedFont>
     <p:embeddedFont>
       <p:font typeface="Source Sans Pro SemiBold" panose="020B0603030403020204" pitchFamily="34" charset="0"/>
-      <p:bold r:id="rId30"/>
-      <p:boldItalic r:id="rId31"/>
-    </p:embeddedFont>
-    <p:embeddedFont>
-      <p:font typeface="Avenir"/>
-      <p:regular r:id="rId32"/>
-      <p:italic r:id="rId33"/>
-    </p:embeddedFont>
-    <p:embeddedFont>
-      <p:font typeface="Merriweather" panose="00000500000000000000" pitchFamily="2" charset="0"/>
-      <p:regular r:id="rId34"/>
-      <p:bold r:id="rId35"/>
-      <p:italic r:id="rId36"/>
-      <p:boldItalic r:id="rId37"/>
-    </p:embeddedFont>
-    <p:embeddedFont>
-      <p:font typeface="Merriweather Sans"/>
-      <p:regular r:id="rId38"/>
-      <p:bold r:id="rId39"/>
-      <p:italic r:id="rId40"/>
+      <p:bold r:id="rId40"/>
       <p:boldItalic r:id="rId41"/>
     </p:embeddedFont>
   </p:embeddedFontLst>
@@ -432,7 +432,7 @@
           <a:p>
             <a:fld id="{5F1244B9-655E-9143-8F11-143B7EBD7CDE}" type="datetimeFigureOut">
               <a:rPr lang="en-US" smtClean="0"/>
-              <a:t>1/8/2020</a:t>
+              <a:t>7/29/20</a:t>
             </a:fld>
             <a:endParaRPr lang="en-US"/>
           </a:p>
@@ -1278,14 +1278,14 @@
               <a:defRPr/>
             </a:pPr>
             <a:r>
-              <a:rPr lang="en-US" dirty="0" smtClean="0"/>
+              <a:rPr lang="en-US" dirty="0"/>
               <a:t>Note to facilitator:</a:t>
             </a:r>
             <a:r>
-              <a:rPr lang="en-US" baseline="0" dirty="0" smtClean="0"/>
+              <a:rPr lang="en-US" baseline="0" dirty="0"/>
               <a:t> To save time, divide the room in half and have half the participants do half the competencies per group. The levels should built upon each other. They should be as succinct as possible.</a:t>
             </a:r>
-            <a:endParaRPr lang="en-US" dirty="0" smtClean="0"/>
+            <a:endParaRPr lang="en-US" dirty="0"/>
           </a:p>
           <a:p>
             <a:endParaRPr lang="en-US" dirty="0"/>
@@ -2607,15 +2607,15 @@
               <a:defRPr/>
             </a:pPr>
             <a:r>
-              <a:rPr lang="en-US" sz="3600" dirty="0" smtClean="0"/>
+              <a:rPr lang="en-US" sz="1600" dirty="0"/>
               <a:t>Notes for instructor:</a:t>
             </a:r>
             <a:r>
-              <a:rPr lang="en-US" sz="3600" baseline="0" dirty="0" smtClean="0"/>
+              <a:rPr lang="en-US" sz="1600" baseline="0" dirty="0"/>
               <a:t> </a:t>
             </a:r>
             <a:r>
-              <a:rPr lang="en-US" sz="3600" dirty="0" smtClean="0"/>
+              <a:rPr lang="en-US" sz="1600" dirty="0"/>
               <a:t>Participants will take about 15 minutes to write down daily job tasks for the role </a:t>
             </a:r>
           </a:p>
@@ -2640,11 +2640,11 @@
               <a:defRPr/>
             </a:pPr>
             <a:r>
-              <a:rPr lang="en-US" sz="3600" dirty="0" smtClean="0"/>
+              <a:rPr lang="en-US" sz="1600" dirty="0"/>
               <a:t>After</a:t>
             </a:r>
             <a:r>
-              <a:rPr lang="en-US" sz="3600" baseline="0" dirty="0" smtClean="0"/>
+              <a:rPr lang="en-US" sz="1600" baseline="0" dirty="0"/>
               <a:t> 10 minutes, if some folks are done, invite them to start coming up to put their tasks down while reading them aloud. If any are multiple tasks in one note, the leader should ask them to break it up into two different notes. If something is not really a task beginning with a verb, it should also be sent back.</a:t>
             </a:r>
           </a:p>
@@ -2669,7 +2669,7 @@
               <a:defRPr/>
             </a:pPr>
             <a:r>
-              <a:rPr lang="en-US" sz="3600" baseline="0" dirty="0" smtClean="0"/>
+              <a:rPr lang="en-US" sz="1600" baseline="0" dirty="0"/>
               <a:t>As people come up to read and add their notes, if they’re similar to another note, they should put them close together.</a:t>
             </a:r>
           </a:p>
@@ -2694,7 +2694,7 @@
               <a:defRPr/>
             </a:pPr>
             <a:r>
-              <a:rPr lang="en-US" sz="3600" baseline="0" dirty="0" smtClean="0"/>
+              <a:rPr lang="en-US" sz="1600" baseline="0" dirty="0"/>
               <a:t>Then the whole group should come up and make sure all common tasks are bunched up together. </a:t>
             </a:r>
           </a:p>
@@ -2719,14 +2719,14 @@
               <a:defRPr/>
             </a:pPr>
             <a:r>
-              <a:rPr lang="en-US" sz="3600" dirty="0" smtClean="0"/>
+              <a:rPr lang="en-US" sz="1600" dirty="0"/>
               <a:t> Then the group can create a competency name that they think is covered</a:t>
             </a:r>
             <a:r>
-              <a:rPr lang="en-US" sz="3600" baseline="0" dirty="0" smtClean="0"/>
+              <a:rPr lang="en-US" sz="1600" baseline="0" dirty="0"/>
               <a:t> by each common group of tasks. </a:t>
             </a:r>
-            <a:endParaRPr lang="en-US" sz="3600" dirty="0" smtClean="0"/>
+            <a:endParaRPr lang="en-US" sz="1600" dirty="0"/>
           </a:p>
           <a:p>
             <a:pPr marL="0" lvl="0" indent="0" algn="l" rtl="0">
@@ -2738,7 +2738,7 @@
               </a:spcAft>
               <a:buNone/>
             </a:pPr>
-            <a:endParaRPr lang="en-US" sz="3600" dirty="0" smtClean="0"/>
+            <a:endParaRPr lang="en-US" sz="1600" dirty="0"/>
           </a:p>
           <a:p>
             <a:pPr marL="0" lvl="0" indent="0" algn="l" rtl="0">
@@ -2751,22 +2751,22 @@
               <a:buNone/>
             </a:pPr>
             <a:r>
-              <a:rPr lang="en-US" sz="3600" dirty="0" smtClean="0"/>
+              <a:rPr lang="en-US" sz="1600" dirty="0"/>
               <a:t>Ask</a:t>
             </a:r>
             <a:r>
-              <a:rPr lang="en-US" sz="3600" baseline="0" dirty="0" smtClean="0"/>
+              <a:rPr lang="en-US" sz="1600" baseline="0" dirty="0"/>
               <a:t> the SMEs if there are any EQ related competencies they think are required that are not represented by the groupings. Also ask them if there is enough technical competencies represented versus only soft competencies (leadership, collaboration, analysis, </a:t>
             </a:r>
             <a:r>
-              <a:rPr lang="en-US" sz="3600" baseline="0" dirty="0" err="1" smtClean="0"/>
+              <a:rPr lang="en-US" sz="1600" baseline="0" dirty="0" err="1"/>
               <a:t>etc</a:t>
             </a:r>
             <a:r>
-              <a:rPr lang="en-US" sz="3600" baseline="0" dirty="0" smtClean="0"/>
+              <a:rPr lang="en-US" sz="1600" baseline="0" dirty="0"/>
               <a:t>).  </a:t>
             </a:r>
-            <a:endParaRPr lang="en-US" sz="3600" dirty="0"/>
+            <a:endParaRPr lang="en-US" sz="1600" dirty="0"/>
           </a:p>
         </p:txBody>
       </p:sp>
@@ -3074,11 +3074,11 @@
           <a:lstStyle/>
           <a:p>
             <a:r>
-              <a:rPr lang="en-US" dirty="0" smtClean="0"/>
+              <a:rPr lang="en-US" dirty="0"/>
               <a:t>Note to facilitator:</a:t>
             </a:r>
             <a:r>
-              <a:rPr lang="en-US" baseline="0" dirty="0" smtClean="0"/>
+              <a:rPr lang="en-US" baseline="0" dirty="0"/>
               <a:t> To save time, divide the room in half and have half the participants do half the competencies per group. The levels should built upon each other. They should be as succinct as possible.</a:t>
             </a:r>
             <a:endParaRPr lang="en-US" dirty="0"/>
@@ -6562,20 +6562,8 @@
           <a:lstStyle/>
           <a:p>
             <a:r>
-              <a:rPr lang="en-US" dirty="0" smtClean="0"/>
-              <a:t>Create </a:t>
-            </a:r>
-            <a:r>
               <a:rPr lang="en-US" dirty="0"/>
-              <a:t>proficiency levels for </a:t>
-            </a:r>
-            <a:r>
-              <a:rPr lang="en-US" dirty="0" smtClean="0"/>
-              <a:t>EACH </a:t>
-            </a:r>
-            <a:r>
-              <a:rPr lang="en-US" dirty="0"/>
-              <a:t>competency</a:t>
+              <a:t>Create proficiency levels for EACH competency</a:t>
             </a:r>
           </a:p>
         </p:txBody>
@@ -6932,35 +6920,14 @@
           <a:p>
             <a:r>
               <a:rPr lang="en-US" dirty="0"/>
-              <a:t>Once you've defined the competencies and their proficiency levels, you establish </a:t>
-            </a:r>
-            <a:r>
-              <a:rPr lang="en-US" dirty="0" smtClean="0"/>
-              <a:t>at which level a year’s worth of experience is required from day one in order to qualify for a certain grade level. </a:t>
-            </a:r>
-          </a:p>
-          <a:p>
-            <a:r>
-              <a:rPr lang="en-US" dirty="0" smtClean="0"/>
-              <a:t>The </a:t>
-            </a:r>
+              <a:t>Once you've defined the competencies and their proficiency levels, you establish at which level a year’s worth of experience is required from day one in order to qualify for a certain grade level. </a:t>
+            </a:r>
+          </a:p>
+          <a:p>
             <a:r>
               <a:rPr lang="en-US" dirty="0"/>
-              <a:t>same set of competencies can be used for different </a:t>
-            </a:r>
-            <a:r>
-              <a:rPr lang="en-US" dirty="0" smtClean="0"/>
-              <a:t>grade levels </a:t>
-            </a:r>
-            <a:r>
-              <a:rPr lang="en-US" dirty="0"/>
-              <a:t>because roles that require more seniority </a:t>
-            </a:r>
-            <a:r>
-              <a:rPr lang="en-US" dirty="0" smtClean="0"/>
-              <a:t>can require more expert proficiency levels.  </a:t>
-            </a:r>
-            <a:endParaRPr lang="en-US" dirty="0"/>
+              <a:t>The same set of competencies can be used for different grade levels because roles that require more seniority can require more expert proficiency levels.  </a:t>
+            </a:r>
           </a:p>
         </p:txBody>
       </p:sp>
@@ -7291,18 +7258,9 @@
               <a:buChar char="•"/>
             </a:pPr>
             <a:r>
-              <a:rPr lang="en-US" dirty="0" smtClean="0"/>
-              <a:t>Bring example </a:t>
-            </a:r>
-            <a:r>
               <a:rPr lang="en-US" dirty="0"/>
-              <a:t>competencies and proficiencies </a:t>
-            </a:r>
-            <a:r>
-              <a:rPr lang="en-US" dirty="0" smtClean="0"/>
-              <a:t>from within the agency and from OPM’s mosaic competencies for potential use as a starting point</a:t>
-            </a:r>
-            <a:endParaRPr lang="en-US" dirty="0"/>
+              <a:t>Bring example competencies and proficiencies from within the agency and from OPM’s mosaic competencies for potential use as a starting point</a:t>
+            </a:r>
           </a:p>
           <a:p>
             <a:pPr marL="742967" indent="-571500">
@@ -7314,13 +7272,8 @@
             </a:pPr>
             <a:r>
               <a:rPr lang="en-US" dirty="0"/>
-              <a:t>Bring workshop supplies: name tags, post-it notes, Sharpies, large easel-size post-it paper, dots for </a:t>
-            </a:r>
-            <a:r>
-              <a:rPr lang="en-US" dirty="0" smtClean="0"/>
-              <a:t>voting</a:t>
-            </a:r>
-            <a:endParaRPr lang="en-US" dirty="0"/>
+              <a:t>Bring workshop supplies: name tags, post-it notes, Sharpies, large easel-size post-it paper, dots for voting</a:t>
+            </a:r>
           </a:p>
           <a:p>
             <a:endParaRPr lang="en-US" dirty="0"/>
@@ -7636,36 +7589,6 @@
           <a:chExt cx="0" cy="0"/>
         </a:xfrm>
       </p:grpSpPr>
-      <p:pic>
-        <p:nvPicPr>
-          <p:cNvPr id="3" name="Picture 2">
-            <a:extLst>
-              <a:ext uri="{FF2B5EF4-FFF2-40B4-BE49-F238E27FC236}">
-                <a16:creationId xmlns:a16="http://schemas.microsoft.com/office/drawing/2014/main" id="{ADA9474B-4EDA-384A-82A2-EA680DF39D9F}"/>
-              </a:ext>
-            </a:extLst>
-          </p:cNvPr>
-          <p:cNvPicPr>
-            <a:picLocks noChangeAspect="1"/>
-          </p:cNvPicPr>
-          <p:nvPr/>
-        </p:nvPicPr>
-        <p:blipFill>
-          <a:blip r:embed="rId3"/>
-          <a:stretch>
-            <a:fillRect/>
-          </a:stretch>
-        </p:blipFill>
-        <p:spPr>
-          <a:xfrm>
-            <a:off x="330200" y="2106153"/>
-            <a:ext cx="16730663" cy="5750832"/>
-          </a:xfrm>
-          <a:prstGeom prst="rect">
-            <a:avLst/>
-          </a:prstGeom>
-        </p:spPr>
-      </p:pic>
       <p:sp>
         <p:nvSpPr>
           <p:cNvPr id="100" name="Google Shape;100;p25"/>
@@ -7699,6 +7622,36 @@
           </a:p>
         </p:txBody>
       </p:sp>
+      <p:pic>
+        <p:nvPicPr>
+          <p:cNvPr id="4" name="Picture 3">
+            <a:extLst>
+              <a:ext uri="{FF2B5EF4-FFF2-40B4-BE49-F238E27FC236}">
+                <a16:creationId xmlns:a16="http://schemas.microsoft.com/office/drawing/2014/main" id="{5D1A5505-D36F-304B-B310-377F3EB84D0D}"/>
+              </a:ext>
+            </a:extLst>
+          </p:cNvPr>
+          <p:cNvPicPr>
+            <a:picLocks noChangeAspect="1"/>
+          </p:cNvPicPr>
+          <p:nvPr/>
+        </p:nvPicPr>
+        <p:blipFill>
+          <a:blip r:embed="rId3"/>
+          <a:stretch>
+            <a:fillRect/>
+          </a:stretch>
+        </p:blipFill>
+        <p:spPr>
+          <a:xfrm>
+            <a:off x="0" y="1619810"/>
+            <a:ext cx="17340263" cy="6513979"/>
+          </a:xfrm>
+          <a:prstGeom prst="rect">
+            <a:avLst/>
+          </a:prstGeom>
+        </p:spPr>
+      </p:pic>
     </p:spTree>
   </p:cSld>
   <p:clrMapOvr>
@@ -8000,19 +7953,14 @@
           <a:p>
             <a:r>
               <a:rPr lang="en-US" dirty="0"/>
-              <a:t>Goal is to select 4–6 critical competencies</a:t>
-            </a:r>
-            <a:r>
-              <a:rPr lang="en-US" dirty="0" smtClean="0"/>
-              <a:t>.</a:t>
-            </a:r>
-          </a:p>
-          <a:p>
-            <a:r>
-              <a:rPr lang="en-US" dirty="0" smtClean="0"/>
+              <a:t>Goal is to select 4–6 critical competencies.</a:t>
+            </a:r>
+          </a:p>
+          <a:p>
+            <a:r>
+              <a:rPr lang="en-US" dirty="0"/>
               <a:t>During this exercise, limit the number of tasks to just 4-5 under each competency.</a:t>
             </a:r>
-            <a:endParaRPr lang="en-US" dirty="0"/>
           </a:p>
           <a:p>
             <a:endParaRPr lang="en-US" dirty="0"/>

</xml_diff>

<commit_message>
initial updates to draft PPT
</commit_message>
<xml_diff>
--- a/toolkit/job-analysis/job-analysis-day-1-presentation.pptx
+++ b/toolkit/job-analysis/job-analysis-day-1-presentation.pptx
@@ -5,10 +5,10 @@
     <p:sldMasterId id="2147483666" r:id="rId1"/>
   </p:sldMasterIdLst>
   <p:notesMasterIdLst>
-    <p:notesMasterId r:id="rId16"/>
+    <p:notesMasterId r:id="rId17"/>
   </p:notesMasterIdLst>
   <p:handoutMasterIdLst>
-    <p:handoutMasterId r:id="rId17"/>
+    <p:handoutMasterId r:id="rId18"/>
   </p:handoutMasterIdLst>
   <p:sldIdLst>
     <p:sldId id="256" r:id="rId2"/>
@@ -25,54 +25,55 @@
     <p:sldId id="331" r:id="rId13"/>
     <p:sldId id="291" r:id="rId14"/>
     <p:sldId id="349" r:id="rId15"/>
+    <p:sldId id="350" r:id="rId16"/>
   </p:sldIdLst>
   <p:sldSz cx="17340263" cy="9753600"/>
   <p:notesSz cx="6881813" cy="9296400"/>
   <p:embeddedFontLst>
     <p:embeddedFont>
       <p:font typeface="Avenir" panose="02000503020000020003" pitchFamily="2" charset="0"/>
-      <p:regular r:id="rId18"/>
-      <p:italic r:id="rId19"/>
+      <p:regular r:id="rId19"/>
+      <p:italic r:id="rId20"/>
     </p:embeddedFont>
     <p:embeddedFont>
       <p:font typeface="Cambria" panose="02040503050406030204" pitchFamily="18" charset="0"/>
-      <p:regular r:id="rId20"/>
-      <p:bold r:id="rId21"/>
-      <p:italic r:id="rId22"/>
-      <p:boldItalic r:id="rId23"/>
+      <p:regular r:id="rId21"/>
+      <p:bold r:id="rId22"/>
+      <p:italic r:id="rId23"/>
+      <p:boldItalic r:id="rId24"/>
     </p:embeddedFont>
     <p:embeddedFont>
       <p:font typeface="Merriweather" pitchFamily="2" charset="77"/>
-      <p:regular r:id="rId24"/>
-      <p:bold r:id="rId25"/>
-      <p:italic r:id="rId26"/>
-      <p:boldItalic r:id="rId27"/>
+      <p:regular r:id="rId25"/>
+      <p:bold r:id="rId26"/>
+      <p:italic r:id="rId27"/>
+      <p:boldItalic r:id="rId28"/>
     </p:embeddedFont>
     <p:embeddedFont>
       <p:font typeface="Merriweather Sans" pitchFamily="2" charset="77"/>
-      <p:regular r:id="rId28"/>
-      <p:bold r:id="rId29"/>
-      <p:italic r:id="rId30"/>
-      <p:boldItalic r:id="rId31"/>
+      <p:regular r:id="rId29"/>
+      <p:bold r:id="rId30"/>
+      <p:italic r:id="rId31"/>
+      <p:boldItalic r:id="rId32"/>
     </p:embeddedFont>
     <p:embeddedFont>
       <p:font typeface="Rockwell" panose="02060603020205020403" pitchFamily="18" charset="77"/>
-      <p:regular r:id="rId32"/>
-      <p:bold r:id="rId33"/>
-      <p:italic r:id="rId34"/>
-      <p:boldItalic r:id="rId35"/>
+      <p:regular r:id="rId33"/>
+      <p:bold r:id="rId34"/>
+      <p:italic r:id="rId35"/>
+      <p:boldItalic r:id="rId36"/>
     </p:embeddedFont>
     <p:embeddedFont>
       <p:font typeface="Source Sans Pro" panose="020B0503030403020204" pitchFamily="34" charset="0"/>
-      <p:regular r:id="rId36"/>
-      <p:bold r:id="rId37"/>
-      <p:italic r:id="rId38"/>
-      <p:boldItalic r:id="rId39"/>
+      <p:regular r:id="rId37"/>
+      <p:bold r:id="rId38"/>
+      <p:italic r:id="rId39"/>
+      <p:boldItalic r:id="rId40"/>
     </p:embeddedFont>
     <p:embeddedFont>
       <p:font typeface="Source Sans Pro SemiBold" panose="020B0603030403020204" pitchFamily="34" charset="0"/>
-      <p:bold r:id="rId40"/>
-      <p:boldItalic r:id="rId41"/>
+      <p:bold r:id="rId41"/>
+      <p:boldItalic r:id="rId42"/>
     </p:embeddedFont>
   </p:embeddedFontLst>
   <p:defaultTextStyle>
@@ -432,7 +433,7 @@
           <a:p>
             <a:fld id="{5F1244B9-655E-9143-8F11-143B7EBD7CDE}" type="datetimeFigureOut">
               <a:rPr lang="en-US" smtClean="0"/>
-              <a:t>7/29/20</a:t>
+              <a:t>8/4/20</a:t>
             </a:fld>
             <a:endParaRPr lang="en-US"/>
           </a:p>
@@ -1473,6 +1474,127 @@
     <p:extLst>
       <p:ext uri="{BB962C8B-B14F-4D97-AF65-F5344CB8AC3E}">
         <p14:creationId xmlns:p14="http://schemas.microsoft.com/office/powerpoint/2010/main" val="3539241794"/>
+      </p:ext>
+    </p:extLst>
+  </p:cSld>
+  <p:clrMapOvr>
+    <a:masterClrMapping/>
+  </p:clrMapOvr>
+</p:notes>
+</file>
+
+<file path=ppt/notesSlides/notesSlide13.xml><?xml version="1.0" encoding="utf-8"?>
+<p:notes xmlns:a="http://schemas.openxmlformats.org/drawingml/2006/main" xmlns:r="http://schemas.openxmlformats.org/officeDocument/2006/relationships" xmlns:p="http://schemas.openxmlformats.org/presentationml/2006/main" showMasterSp="0" showMasterPhAnim="0">
+  <p:cSld>
+    <p:spTree>
+      <p:nvGrpSpPr>
+        <p:cNvPr id="1" name="Shape 304"/>
+        <p:cNvGrpSpPr/>
+        <p:nvPr/>
+      </p:nvGrpSpPr>
+      <p:grpSpPr>
+        <a:xfrm>
+          <a:off x="0" y="0"/>
+          <a:ext cx="0" cy="0"/>
+          <a:chOff x="0" y="0"/>
+          <a:chExt cx="0" cy="0"/>
+        </a:xfrm>
+      </p:grpSpPr>
+      <p:sp>
+        <p:nvSpPr>
+          <p:cNvPr id="305" name="Google Shape;305;p34:notes"/>
+          <p:cNvSpPr txBox="1">
+            <a:spLocks noGrp="1"/>
+          </p:cNvSpPr>
+          <p:nvPr>
+            <p:ph type="body" idx="1"/>
+          </p:nvPr>
+        </p:nvSpPr>
+        <p:spPr>
+          <a:xfrm>
+            <a:off x="917575" y="4415790"/>
+            <a:ext cx="5046663" cy="4183380"/>
+          </a:xfrm>
+          <a:prstGeom prst="rect">
+            <a:avLst/>
+          </a:prstGeom>
+          <a:noFill/>
+          <a:ln>
+            <a:noFill/>
+          </a:ln>
+        </p:spPr>
+        <p:txBody>
+          <a:bodyPr spcFirstLastPara="1" wrap="square" lIns="92425" tIns="46200" rIns="92425" bIns="46200" anchor="t" anchorCtr="0">
+            <a:noAutofit/>
+          </a:bodyPr>
+          <a:lstStyle/>
+          <a:p>
+            <a:pPr marL="0" lvl="0" indent="0" algn="l" rtl="0">
+              <a:lnSpc>
+                <a:spcPct val="100000"/>
+              </a:lnSpc>
+              <a:spcBef>
+                <a:spcPts val="0"/>
+              </a:spcBef>
+              <a:spcAft>
+                <a:spcPts val="0"/>
+              </a:spcAft>
+              <a:buSzPts val="1400"/>
+              <a:buNone/>
+            </a:pPr>
+            <a:endParaRPr/>
+          </a:p>
+        </p:txBody>
+      </p:sp>
+      <p:sp>
+        <p:nvSpPr>
+          <p:cNvPr id="306" name="Google Shape;306;p34:notes"/>
+          <p:cNvSpPr>
+            <a:spLocks noGrp="1" noRot="1" noChangeAspect="1"/>
+          </p:cNvSpPr>
+          <p:nvPr>
+            <p:ph type="sldImg" idx="2"/>
+          </p:nvPr>
+        </p:nvSpPr>
+        <p:spPr>
+          <a:xfrm>
+            <a:off x="342900" y="696913"/>
+            <a:ext cx="6197600" cy="3486150"/>
+          </a:xfrm>
+          <a:custGeom>
+            <a:avLst/>
+            <a:gdLst/>
+            <a:ahLst/>
+            <a:cxnLst/>
+            <a:rect l="l" t="t" r="r" b="b"/>
+            <a:pathLst>
+              <a:path w="120000" h="120000" extrusionOk="0">
+                <a:moveTo>
+                  <a:pt x="0" y="0"/>
+                </a:moveTo>
+                <a:lnTo>
+                  <a:pt x="120000" y="0"/>
+                </a:lnTo>
+                <a:lnTo>
+                  <a:pt x="120000" y="120000"/>
+                </a:lnTo>
+                <a:lnTo>
+                  <a:pt x="0" y="120000"/>
+                </a:lnTo>
+                <a:close/>
+              </a:path>
+            </a:pathLst>
+          </a:custGeom>
+          <a:noFill/>
+          <a:ln>
+            <a:noFill/>
+          </a:ln>
+        </p:spPr>
+      </p:sp>
+    </p:spTree>
+    <p:extLst>
+      <p:ext uri="{BB962C8B-B14F-4D97-AF65-F5344CB8AC3E}">
+        <p14:creationId xmlns:p14="http://schemas.microsoft.com/office/powerpoint/2010/main" val="1781028920"/>
       </p:ext>
     </p:extLst>
   </p:cSld>
@@ -6963,29 +7085,40 @@
       </p:grpSpPr>
       <p:sp>
         <p:nvSpPr>
-          <p:cNvPr id="2" name="Text Placeholder 1">
+          <p:cNvPr id="4" name="Google Shape;68;p20">
             <a:extLst>
               <a:ext uri="{FF2B5EF4-FFF2-40B4-BE49-F238E27FC236}">
-                <a16:creationId xmlns:a16="http://schemas.microsoft.com/office/drawing/2014/main" id="{869287C3-7579-1A46-84D5-F80BC36BAECA}"/>
+                <a16:creationId xmlns:a16="http://schemas.microsoft.com/office/drawing/2014/main" id="{FF013F16-4A52-9A45-B7A8-5DE84E4CEFE2}"/>
               </a:ext>
             </a:extLst>
           </p:cNvPr>
-          <p:cNvSpPr>
+          <p:cNvSpPr txBox="1">
             <a:spLocks noGrp="1"/>
           </p:cNvSpPr>
           <p:nvPr>
             <p:ph type="body" idx="1"/>
           </p:nvPr>
         </p:nvSpPr>
-        <p:spPr/>
+        <p:spPr>
+          <a:xfrm>
+            <a:off x="2308393" y="4027713"/>
+            <a:ext cx="12723989" cy="2893800"/>
+          </a:xfrm>
+        </p:spPr>
         <p:txBody>
-          <a:bodyPr/>
+          <a:bodyPr>
+            <a:normAutofit/>
+          </a:bodyPr>
           <a:lstStyle/>
           <a:p>
-            <a:r>
-              <a:rPr lang="en-US" dirty="0"/>
-              <a:t>The End</a:t>
-            </a:r>
+            <a:pPr lvl="0"/>
+            <a:r>
+              <a:rPr lang="en-US" dirty="0">
+                <a:sym typeface="Cambria"/>
+              </a:rPr>
+              <a:t>End of Day 1 Presentation</a:t>
+            </a:r>
+            <a:endParaRPr lang="en-US" dirty="0"/>
           </a:p>
         </p:txBody>
       </p:sp>
@@ -7146,6 +7279,75 @@
     <p:extLst>
       <p:ext uri="{BB962C8B-B14F-4D97-AF65-F5344CB8AC3E}">
         <p14:creationId xmlns:p14="http://schemas.microsoft.com/office/powerpoint/2010/main" val="2239205312"/>
+      </p:ext>
+    </p:extLst>
+  </p:cSld>
+  <p:clrMapOvr>
+    <a:masterClrMapping/>
+  </p:clrMapOvr>
+</p:sld>
+</file>
+
+<file path=ppt/slides/slide15.xml><?xml version="1.0" encoding="utf-8"?>
+<p:sld xmlns:a="http://schemas.openxmlformats.org/drawingml/2006/main" xmlns:r="http://schemas.openxmlformats.org/officeDocument/2006/relationships" xmlns:p="http://schemas.openxmlformats.org/presentationml/2006/main">
+  <p:cSld>
+    <p:spTree>
+      <p:nvGrpSpPr>
+        <p:cNvPr id="1" name="Shape 307"/>
+        <p:cNvGrpSpPr/>
+        <p:nvPr/>
+      </p:nvGrpSpPr>
+      <p:grpSpPr>
+        <a:xfrm>
+          <a:off x="0" y="0"/>
+          <a:ext cx="0" cy="0"/>
+          <a:chOff x="0" y="0"/>
+          <a:chExt cx="0" cy="0"/>
+        </a:xfrm>
+      </p:grpSpPr>
+      <p:sp>
+        <p:nvSpPr>
+          <p:cNvPr id="4" name="Google Shape;68;p20">
+            <a:extLst>
+              <a:ext uri="{FF2B5EF4-FFF2-40B4-BE49-F238E27FC236}">
+                <a16:creationId xmlns:a16="http://schemas.microsoft.com/office/drawing/2014/main" id="{FF013F16-4A52-9A45-B7A8-5DE84E4CEFE2}"/>
+              </a:ext>
+            </a:extLst>
+          </p:cNvPr>
+          <p:cNvSpPr txBox="1">
+            <a:spLocks noGrp="1"/>
+          </p:cNvSpPr>
+          <p:nvPr>
+            <p:ph type="body" idx="1"/>
+          </p:nvPr>
+        </p:nvSpPr>
+        <p:spPr>
+          <a:xfrm>
+            <a:off x="2308393" y="4027713"/>
+            <a:ext cx="12723989" cy="2893800"/>
+          </a:xfrm>
+        </p:spPr>
+        <p:txBody>
+          <a:bodyPr>
+            <a:normAutofit/>
+          </a:bodyPr>
+          <a:lstStyle/>
+          <a:p>
+            <a:pPr lvl="0"/>
+            <a:r>
+              <a:rPr lang="en-US" dirty="0">
+                <a:sym typeface="Cambria"/>
+              </a:rPr>
+              <a:t>Start of Day 2 Presentation</a:t>
+            </a:r>
+            <a:endParaRPr lang="en-US" dirty="0"/>
+          </a:p>
+        </p:txBody>
+      </p:sp>
+    </p:spTree>
+    <p:extLst>
+      <p:ext uri="{BB962C8B-B14F-4D97-AF65-F5344CB8AC3E}">
+        <p14:creationId xmlns:p14="http://schemas.microsoft.com/office/powerpoint/2010/main" val="717651396"/>
       </p:ext>
     </p:extLst>
   </p:cSld>

</xml_diff>